<commit_message>
updated dag with ets
</commit_message>
<xml_diff>
--- a/docs/DAG.pptx
+++ b/docs/DAG.pptx
@@ -4678,7 +4678,7 @@
         </p:nvSpPr>
         <p:spPr>
           <a:xfrm>
-            <a:off x="3459192" y="4804913"/>
+            <a:off x="8188767" y="4640641"/>
             <a:ext cx="730072" cy="369332"/>
           </a:xfrm>
           <a:prstGeom prst="rect">
@@ -4687,13 +4687,13 @@
         </p:spPr>
         <p:style>
           <a:lnRef idx="2">
-            <a:schemeClr val="dk1"/>
+            <a:schemeClr val="accent3"/>
           </a:lnRef>
           <a:fillRef idx="1">
             <a:schemeClr val="lt1"/>
           </a:fillRef>
           <a:effectRef idx="0">
-            <a:schemeClr val="dk1"/>
+            <a:schemeClr val="accent3"/>
           </a:effectRef>
           <a:fontRef idx="minor">
             <a:schemeClr val="dk1"/>
@@ -4706,13 +4706,142 @@
           <a:lstStyle/>
           <a:p>
             <a:r>
-              <a:rPr lang="en-GB" dirty="0" err="1"/>
+              <a:rPr lang="en-GB" dirty="0" err="1">
+                <a:solidFill>
+                  <a:schemeClr val="bg1">
+                    <a:lumMod val="65000"/>
+                  </a:schemeClr>
+                </a:solidFill>
+              </a:rPr>
               <a:t>N_ets</a:t>
             </a:r>
-            <a:endParaRPr lang="en-GB" dirty="0"/>
-          </a:p>
-        </p:txBody>
-      </p:sp>
+            <a:endParaRPr lang="en-GB" dirty="0">
+              <a:solidFill>
+                <a:schemeClr val="bg1">
+                  <a:lumMod val="65000"/>
+                </a:schemeClr>
+              </a:solidFill>
+            </a:endParaRPr>
+          </a:p>
+        </p:txBody>
+      </p:sp>
+      <p:cxnSp>
+        <p:nvCxnSpPr>
+          <p:cNvPr id="10" name="Straight Arrow Connector 9">
+            <a:extLst>
+              <a:ext uri="{FF2B5EF4-FFF2-40B4-BE49-F238E27FC236}">
+                <a16:creationId xmlns:a16="http://schemas.microsoft.com/office/drawing/2014/main" id="{8E9A450D-5EC2-E1C0-DADB-5ADEF9DC7696}"/>
+              </a:ext>
+            </a:extLst>
+          </p:cNvPr>
+          <p:cNvCxnSpPr>
+            <a:cxnSpLocks/>
+          </p:cNvCxnSpPr>
+          <p:nvPr/>
+        </p:nvCxnSpPr>
+        <p:spPr>
+          <a:xfrm flipH="1">
+            <a:off x="8830276" y="2852264"/>
+            <a:ext cx="910457" cy="1788377"/>
+          </a:xfrm>
+          <a:prstGeom prst="straightConnector1">
+            <a:avLst/>
+          </a:prstGeom>
+          <a:ln>
+            <a:tailEnd type="triangle"/>
+          </a:ln>
+        </p:spPr>
+        <p:style>
+          <a:lnRef idx="1">
+            <a:schemeClr val="accent3"/>
+          </a:lnRef>
+          <a:fillRef idx="0">
+            <a:schemeClr val="accent3"/>
+          </a:fillRef>
+          <a:effectRef idx="0">
+            <a:schemeClr val="accent3"/>
+          </a:effectRef>
+          <a:fontRef idx="minor">
+            <a:schemeClr val="tx1"/>
+          </a:fontRef>
+        </p:style>
+      </p:cxnSp>
+      <p:sp>
+        <p:nvSpPr>
+          <p:cNvPr id="15" name="TextBox 14">
+            <a:extLst>
+              <a:ext uri="{FF2B5EF4-FFF2-40B4-BE49-F238E27FC236}">
+                <a16:creationId xmlns:a16="http://schemas.microsoft.com/office/drawing/2014/main" id="{8E4B78E7-B481-C5A4-CDFE-76C633500070}"/>
+              </a:ext>
+            </a:extLst>
+          </p:cNvPr>
+          <p:cNvSpPr txBox="1"/>
+          <p:nvPr/>
+        </p:nvSpPr>
+        <p:spPr>
+          <a:xfrm>
+            <a:off x="9199512" y="4154375"/>
+            <a:ext cx="292068" cy="369332"/>
+          </a:xfrm>
+          <a:prstGeom prst="rect">
+            <a:avLst/>
+          </a:prstGeom>
+          <a:noFill/>
+        </p:spPr>
+        <p:txBody>
+          <a:bodyPr wrap="none" rtlCol="0">
+            <a:spAutoFit/>
+          </a:bodyPr>
+          <a:lstStyle/>
+          <a:p>
+            <a:r>
+              <a:rPr lang="en-GB" dirty="0"/>
+              <a:t>?</a:t>
+            </a:r>
+          </a:p>
+        </p:txBody>
+      </p:sp>
+      <p:cxnSp>
+        <p:nvCxnSpPr>
+          <p:cNvPr id="42" name="Straight Arrow Connector 41">
+            <a:extLst>
+              <a:ext uri="{FF2B5EF4-FFF2-40B4-BE49-F238E27FC236}">
+                <a16:creationId xmlns:a16="http://schemas.microsoft.com/office/drawing/2014/main" id="{10CA8555-9616-5182-48BE-005838E01819}"/>
+              </a:ext>
+            </a:extLst>
+          </p:cNvPr>
+          <p:cNvCxnSpPr>
+            <a:stCxn id="45" idx="3"/>
+          </p:cNvCxnSpPr>
+          <p:nvPr/>
+        </p:nvCxnSpPr>
+        <p:spPr>
+          <a:xfrm>
+            <a:off x="7502964" y="3692710"/>
+            <a:ext cx="841109" cy="955323"/>
+          </a:xfrm>
+          <a:prstGeom prst="straightConnector1">
+            <a:avLst/>
+          </a:prstGeom>
+          <a:ln>
+            <a:tailEnd type="triangle"/>
+          </a:ln>
+        </p:spPr>
+        <p:style>
+          <a:lnRef idx="1">
+            <a:schemeClr val="accent3"/>
+          </a:lnRef>
+          <a:fillRef idx="0">
+            <a:schemeClr val="accent3"/>
+          </a:fillRef>
+          <a:effectRef idx="0">
+            <a:schemeClr val="accent3"/>
+          </a:effectRef>
+          <a:fontRef idx="minor">
+            <a:schemeClr val="tx1"/>
+          </a:fontRef>
+        </p:style>
+      </p:cxnSp>
     </p:spTree>
     <p:extLst>
       <p:ext uri="{BB962C8B-B14F-4D97-AF65-F5344CB8AC3E}">
@@ -5241,13 +5370,25 @@
           <a:lstStyle/>
           <a:p>
             <a:r>
-              <a:rPr lang="en-GB" dirty="0"/>
+              <a:rPr lang="en-GB" dirty="0">
+                <a:solidFill>
+                  <a:schemeClr val="bg1">
+                    <a:lumMod val="65000"/>
+                  </a:schemeClr>
+                </a:solidFill>
+              </a:rPr>
               <a:t>All-cause</a:t>
             </a:r>
           </a:p>
           <a:p>
             <a:r>
-              <a:rPr lang="en-GB" dirty="0"/>
+              <a:rPr lang="en-GB" dirty="0">
+                <a:solidFill>
+                  <a:schemeClr val="bg1">
+                    <a:lumMod val="65000"/>
+                  </a:schemeClr>
+                </a:solidFill>
+              </a:rPr>
               <a:t>mortality</a:t>
             </a:r>
           </a:p>
@@ -5363,14 +5504,14 @@
           </a:ln>
         </p:spPr>
         <p:style>
-          <a:lnRef idx="1">
-            <a:schemeClr val="accent1"/>
+          <a:lnRef idx="2">
+            <a:schemeClr val="accent3"/>
           </a:lnRef>
           <a:fillRef idx="0">
-            <a:schemeClr val="accent1"/>
+            <a:schemeClr val="accent3"/>
           </a:fillRef>
-          <a:effectRef idx="0">
-            <a:schemeClr val="accent1"/>
+          <a:effectRef idx="1">
+            <a:schemeClr val="accent3"/>
           </a:effectRef>
           <a:fontRef idx="minor">
             <a:schemeClr val="tx1"/>
@@ -5476,7 +5617,13 @@
           <a:lstStyle/>
           <a:p>
             <a:r>
-              <a:rPr lang="en-GB" dirty="0"/>
+              <a:rPr lang="en-GB" dirty="0">
+                <a:solidFill>
+                  <a:schemeClr val="bg1">
+                    <a:lumMod val="65000"/>
+                  </a:schemeClr>
+                </a:solidFill>
+              </a:rPr>
               <a:t>S3</a:t>
             </a:r>
           </a:p>

</xml_diff>